<commit_message>
mislabelled figure in presentation
</commit_message>
<xml_diff>
--- a/Presentation Phase2.pptx
+++ b/Presentation Phase2.pptx
@@ -7703,7 +7703,7 @@
             <p:ph idx="1"/>
             <p:extLst>
               <p:ext uri="{D42A27DB-BD31-4B8C-83A1-F6EECF244321}">
-                <p14:modId xmlns:p14="http://schemas.microsoft.com/office/powerpoint/2010/main" val="1138267634"/>
+                <p14:modId xmlns:p14="http://schemas.microsoft.com/office/powerpoint/2010/main" val="3646991382"/>
               </p:ext>
             </p:extLst>
           </p:nvPr>
@@ -7747,12 +7747,12 @@
                     <a:p>
                       <a:pPr algn="ctr"/>
                       <a:r>
-                        <a:rPr lang="en-GB" dirty="0" err="1" smtClean="0"/>
-                        <a:t>Matlab</a:t>
+                        <a:rPr lang="en-GB" dirty="0" smtClean="0"/>
+                        <a:t>C Code </a:t>
                       </a:r>
                       <a:r>
                         <a:rPr lang="en-GB" dirty="0" smtClean="0"/>
-                        <a:t> Code Runtime (s)</a:t>
+                        <a:t>Runtime (s)</a:t>
                       </a:r>
                       <a:endParaRPr lang="en-GB" dirty="0"/>
                     </a:p>
@@ -7766,13 +7766,18 @@
                     <a:p>
                       <a:pPr algn="ctr"/>
                       <a:r>
-                        <a:rPr lang="en-GB" dirty="0" smtClean="0"/>
-                        <a:t>C</a:t>
+                        <a:rPr lang="en-GB" dirty="0" err="1" smtClean="0"/>
+                        <a:t>Matlab</a:t>
                       </a:r>
                       <a:r>
-                        <a:rPr lang="en-GB" baseline="0" dirty="0" smtClean="0"/>
-                        <a:t> Code </a:t>
+                        <a:rPr lang="en-GB" smtClean="0"/>
+                        <a:t> </a:t>
                       </a:r>
+                      <a:r>
+                        <a:rPr lang="en-GB" baseline="0" smtClean="0"/>
+                        <a:t>Code </a:t>
+                      </a:r>
+                      <a:endParaRPr lang="en-GB" baseline="0" dirty="0" smtClean="0"/>
                     </a:p>
                     <a:p>
                       <a:pPr algn="ctr"/>
@@ -10763,11 +10768,7 @@
           <a:p>
             <a:r>
               <a:rPr lang="en-GB" dirty="0" smtClean="0"/>
-              <a:t>Extensions </a:t>
-            </a:r>
-            <a:r>
-              <a:rPr lang="en-GB" dirty="0" smtClean="0"/>
-              <a:t>3</a:t>
+              <a:t>Extensions 3</a:t>
             </a:r>
             <a:endParaRPr lang="en-GB" dirty="0"/>
           </a:p>
@@ -17233,11 +17234,7 @@
           <a:p>
             <a:r>
               <a:rPr lang="en-GB" dirty="0" smtClean="0"/>
-              <a:t>In code, </a:t>
-            </a:r>
-            <a:r>
-              <a:rPr lang="en-GB" dirty="0" smtClean="0"/>
-              <a:t>this means…</a:t>
+              <a:t>In code, this means…</a:t>
             </a:r>
             <a:endParaRPr lang="en-GB" dirty="0"/>
           </a:p>

</xml_diff>